<commit_message>
Bug fixes reported by Santosh last week
</commit_message>
<xml_diff>
--- a/ocms/src/main/webapp/resources/docs/OCMS.pptx
+++ b/ocms/src/main/webapp/resources/docs/OCMS.pptx
@@ -296,7 +296,7 @@
           <a:p>
             <a:fld id="{34AB8877-0AA4-4FC4-A76E-1998D28D0646}" type="datetimeFigureOut">
               <a:rPr lang="en-US" smtClean="0"/>
-              <a:t>4/6/2013</a:t>
+              <a:t>7/18/13</a:t>
             </a:fld>
             <a:endParaRPr lang="en-US"/>
           </a:p>
@@ -466,7 +466,7 @@
           <a:p>
             <a:fld id="{34AB8877-0AA4-4FC4-A76E-1998D28D0646}" type="datetimeFigureOut">
               <a:rPr lang="en-US" smtClean="0"/>
-              <a:t>4/6/2013</a:t>
+              <a:t>7/18/13</a:t>
             </a:fld>
             <a:endParaRPr lang="en-US"/>
           </a:p>
@@ -646,7 +646,7 @@
           <a:p>
             <a:fld id="{34AB8877-0AA4-4FC4-A76E-1998D28D0646}" type="datetimeFigureOut">
               <a:rPr lang="en-US" smtClean="0"/>
-              <a:t>4/6/2013</a:t>
+              <a:t>7/18/13</a:t>
             </a:fld>
             <a:endParaRPr lang="en-US"/>
           </a:p>
@@ -816,7 +816,7 @@
           <a:p>
             <a:fld id="{34AB8877-0AA4-4FC4-A76E-1998D28D0646}" type="datetimeFigureOut">
               <a:rPr lang="en-US" smtClean="0"/>
-              <a:t>4/6/2013</a:t>
+              <a:t>7/18/13</a:t>
             </a:fld>
             <a:endParaRPr lang="en-US"/>
           </a:p>
@@ -1062,7 +1062,7 @@
           <a:p>
             <a:fld id="{34AB8877-0AA4-4FC4-A76E-1998D28D0646}" type="datetimeFigureOut">
               <a:rPr lang="en-US" smtClean="0"/>
-              <a:t>4/6/2013</a:t>
+              <a:t>7/18/13</a:t>
             </a:fld>
             <a:endParaRPr lang="en-US"/>
           </a:p>
@@ -1350,7 +1350,7 @@
           <a:p>
             <a:fld id="{34AB8877-0AA4-4FC4-A76E-1998D28D0646}" type="datetimeFigureOut">
               <a:rPr lang="en-US" smtClean="0"/>
-              <a:t>4/6/2013</a:t>
+              <a:t>7/18/13</a:t>
             </a:fld>
             <a:endParaRPr lang="en-US"/>
           </a:p>
@@ -1772,7 +1772,7 @@
           <a:p>
             <a:fld id="{34AB8877-0AA4-4FC4-A76E-1998D28D0646}" type="datetimeFigureOut">
               <a:rPr lang="en-US" smtClean="0"/>
-              <a:t>4/6/2013</a:t>
+              <a:t>7/18/13</a:t>
             </a:fld>
             <a:endParaRPr lang="en-US"/>
           </a:p>
@@ -1890,7 +1890,7 @@
           <a:p>
             <a:fld id="{34AB8877-0AA4-4FC4-A76E-1998D28D0646}" type="datetimeFigureOut">
               <a:rPr lang="en-US" smtClean="0"/>
-              <a:t>4/6/2013</a:t>
+              <a:t>7/18/13</a:t>
             </a:fld>
             <a:endParaRPr lang="en-US"/>
           </a:p>
@@ -1985,7 +1985,7 @@
           <a:p>
             <a:fld id="{34AB8877-0AA4-4FC4-A76E-1998D28D0646}" type="datetimeFigureOut">
               <a:rPr lang="en-US" smtClean="0"/>
-              <a:t>4/6/2013</a:t>
+              <a:t>7/18/13</a:t>
             </a:fld>
             <a:endParaRPr lang="en-US"/>
           </a:p>
@@ -2262,7 +2262,7 @@
           <a:p>
             <a:fld id="{34AB8877-0AA4-4FC4-A76E-1998D28D0646}" type="datetimeFigureOut">
               <a:rPr lang="en-US" smtClean="0"/>
-              <a:t>4/6/2013</a:t>
+              <a:t>7/18/13</a:t>
             </a:fld>
             <a:endParaRPr lang="en-US"/>
           </a:p>
@@ -2515,7 +2515,7 @@
           <a:p>
             <a:fld id="{34AB8877-0AA4-4FC4-A76E-1998D28D0646}" type="datetimeFigureOut">
               <a:rPr lang="en-US" smtClean="0"/>
-              <a:t>4/6/2013</a:t>
+              <a:t>7/18/13</a:t>
             </a:fld>
             <a:endParaRPr lang="en-US"/>
           </a:p>
@@ -2737,7 +2737,7 @@
           <a:p>
             <a:fld id="{34AB8877-0AA4-4FC4-A76E-1998D28D0646}" type="datetimeFigureOut">
               <a:rPr lang="en-US" smtClean="0"/>
-              <a:t>4/6/2013</a:t>
+              <a:t>7/18/13</a:t>
             </a:fld>
             <a:endParaRPr lang="en-US"/>
           </a:p>
@@ -3806,7 +3806,7 @@
           </a:prstGeom>
           <a:noFill/>
           <a:extLst>
-            <a:ext uri="{909E8E84-426E-40DD-AFC4-6F175D3DCCD1}">
+            <a:ext uri="{909E8E84-426E-40dd-AFC4-6F175D3DCCD1}">
               <a14:hiddenFill xmlns:a14="http://schemas.microsoft.com/office/drawing/2010/main">
                 <a:solidFill>
                   <a:srgbClr val="FFFFFF"/>
@@ -3829,7 +3829,7 @@
   <p:timing>
     <p:tnLst>
       <p:par>
-        <p:cTn id="1" dur="indefinite" restart="never" nodeType="tmRoot"/>
+        <p:cTn xmlns:p14="http://schemas.microsoft.com/office/powerpoint/2010/main" id="1" dur="indefinite" restart="never" nodeType="tmRoot"/>
       </p:par>
     </p:tnLst>
   </p:timing>
@@ -3884,7 +3884,7 @@
           </a:prstGeom>
           <a:noFill/>
           <a:extLst>
-            <a:ext uri="{909E8E84-426E-40DD-AFC4-6F175D3DCCD1}">
+            <a:ext uri="{909E8E84-426E-40dd-AFC4-6F175D3DCCD1}">
               <a14:hiddenFill xmlns:a14="http://schemas.microsoft.com/office/drawing/2010/main">
                 <a:solidFill>
                   <a:srgbClr val="FFFFFF"/>
@@ -3907,7 +3907,7 @@
   <p:timing>
     <p:tnLst>
       <p:par>
-        <p:cTn id="1" dur="indefinite" restart="never" nodeType="tmRoot"/>
+        <p:cTn xmlns:p14="http://schemas.microsoft.com/office/powerpoint/2010/main" id="1" dur="indefinite" restart="never" nodeType="tmRoot"/>
       </p:par>
     </p:tnLst>
   </p:timing>
@@ -4104,7 +4104,7 @@
   <p:timing>
     <p:tnLst>
       <p:par>
-        <p:cTn id="1" dur="indefinite" restart="never" nodeType="tmRoot"/>
+        <p:cTn xmlns:p14="http://schemas.microsoft.com/office/powerpoint/2010/main" id="1" dur="indefinite" restart="never" nodeType="tmRoot"/>
       </p:par>
     </p:tnLst>
   </p:timing>
@@ -4173,15 +4173,18 @@
           </a:p>
           <a:p>
             <a:r>
+              <a:rPr lang="en-US" dirty="0" err="1" smtClean="0"/>
+              <a:t>Mahender</a:t>
+            </a:r>
+            <a:r>
               <a:rPr lang="en-US" dirty="0" smtClean="0"/>
-              <a:t>Mahender Singh</a:t>
-            </a:r>
-          </a:p>
-          <a:p>
+              <a:t> </a:t>
+            </a:r>
             <a:r>
               <a:rPr lang="en-US" dirty="0" smtClean="0"/>
-              <a:t>Rishi</a:t>
-            </a:r>
+              <a:t>Singh</a:t>
+            </a:r>
+            <a:endParaRPr lang="en-US" dirty="0" smtClean="0"/>
           </a:p>
           <a:p>
             <a:r>
@@ -4204,7 +4207,7 @@
   <p:timing>
     <p:tnLst>
       <p:par>
-        <p:cTn id="1" dur="indefinite" restart="never" nodeType="tmRoot"/>
+        <p:cTn xmlns:p14="http://schemas.microsoft.com/office/powerpoint/2010/main" id="1" dur="indefinite" restart="never" nodeType="tmRoot"/>
       </p:par>
     </p:tnLst>
   </p:timing>
@@ -4329,7 +4332,7 @@
   <p:timing>
     <p:tnLst>
       <p:par>
-        <p:cTn id="1" dur="indefinite" restart="never" nodeType="tmRoot"/>
+        <p:cTn xmlns:p14="http://schemas.microsoft.com/office/powerpoint/2010/main" id="1" dur="indefinite" restart="never" nodeType="tmRoot"/>
       </p:par>
     </p:tnLst>
   </p:timing>
@@ -4637,7 +4640,7 @@
           </a:prstGeom>
           <a:noFill/>
           <a:extLst>
-            <a:ext uri="{909E8E84-426E-40DD-AFC4-6F175D3DCCD1}">
+            <a:ext uri="{909E8E84-426E-40dd-AFC4-6F175D3DCCD1}">
               <a14:hiddenFill xmlns:a14="http://schemas.microsoft.com/office/drawing/2010/main">
                 <a:solidFill>
                   <a:srgbClr val="FFFFFF"/>
@@ -4678,7 +4681,7 @@
           </a:prstGeom>
           <a:noFill/>
           <a:extLst>
-            <a:ext uri="{909E8E84-426E-40DD-AFC4-6F175D3DCCD1}">
+            <a:ext uri="{909E8E84-426E-40dd-AFC4-6F175D3DCCD1}">
               <a14:hiddenFill xmlns:a14="http://schemas.microsoft.com/office/drawing/2010/main">
                 <a:solidFill>
                   <a:srgbClr val="FFFFFF"/>
@@ -4701,7 +4704,7 @@
   <p:timing>
     <p:tnLst>
       <p:par>
-        <p:cTn id="1" dur="indefinite" restart="never" nodeType="tmRoot"/>
+        <p:cTn xmlns:p14="http://schemas.microsoft.com/office/powerpoint/2010/main" id="1" dur="indefinite" restart="never" nodeType="tmRoot"/>
       </p:par>
     </p:tnLst>
   </p:timing>
@@ -4866,7 +4869,7 @@
           </a:prstGeom>
           <a:noFill/>
           <a:extLst>
-            <a:ext uri="{909E8E84-426E-40DD-AFC4-6F175D3DCCD1}">
+            <a:ext uri="{909E8E84-426E-40dd-AFC4-6F175D3DCCD1}">
               <a14:hiddenFill xmlns:a14="http://schemas.microsoft.com/office/drawing/2010/main">
                 <a:solidFill>
                   <a:srgbClr val="FFFFFF"/>
@@ -4907,7 +4910,7 @@
           </a:prstGeom>
           <a:noFill/>
           <a:extLst>
-            <a:ext uri="{909E8E84-426E-40DD-AFC4-6F175D3DCCD1}">
+            <a:ext uri="{909E8E84-426E-40dd-AFC4-6F175D3DCCD1}">
               <a14:hiddenFill xmlns:a14="http://schemas.microsoft.com/office/drawing/2010/main">
                 <a:solidFill>
                   <a:srgbClr val="FFFFFF"/>
@@ -4930,7 +4933,7 @@
   <p:timing>
     <p:tnLst>
       <p:par>
-        <p:cTn id="1" dur="indefinite" restart="never" nodeType="tmRoot"/>
+        <p:cTn xmlns:p14="http://schemas.microsoft.com/office/powerpoint/2010/main" id="1" dur="indefinite" restart="never" nodeType="tmRoot"/>
       </p:par>
     </p:tnLst>
   </p:timing>
@@ -5092,7 +5095,7 @@
           </a:prstGeom>
           <a:noFill/>
           <a:extLst>
-            <a:ext uri="{909E8E84-426E-40DD-AFC4-6F175D3DCCD1}">
+            <a:ext uri="{909E8E84-426E-40dd-AFC4-6F175D3DCCD1}">
               <a14:hiddenFill xmlns:a14="http://schemas.microsoft.com/office/drawing/2010/main">
                 <a:solidFill>
                   <a:srgbClr val="FFFFFF"/>
@@ -5133,7 +5136,7 @@
           </a:prstGeom>
           <a:noFill/>
           <a:extLst>
-            <a:ext uri="{909E8E84-426E-40DD-AFC4-6F175D3DCCD1}">
+            <a:ext uri="{909E8E84-426E-40dd-AFC4-6F175D3DCCD1}">
               <a14:hiddenFill xmlns:a14="http://schemas.microsoft.com/office/drawing/2010/main">
                 <a:solidFill>
                   <a:srgbClr val="FFFFFF"/>
@@ -5156,7 +5159,7 @@
   <p:timing>
     <p:tnLst>
       <p:par>
-        <p:cTn id="1" dur="indefinite" restart="never" nodeType="tmRoot"/>
+        <p:cTn xmlns:p14="http://schemas.microsoft.com/office/powerpoint/2010/main" id="1" dur="indefinite" restart="never" nodeType="tmRoot"/>
       </p:par>
     </p:tnLst>
   </p:timing>
@@ -5245,7 +5248,7 @@
   <p:timing>
     <p:tnLst>
       <p:par>
-        <p:cTn id="1" dur="indefinite" restart="never" nodeType="tmRoot"/>
+        <p:cTn xmlns:p14="http://schemas.microsoft.com/office/powerpoint/2010/main" id="1" dur="indefinite" restart="never" nodeType="tmRoot"/>
       </p:par>
     </p:tnLst>
   </p:timing>

</xml_diff>